<commit_message>
removed shadow and console
git-svn-id: https://svn.vis.ethz.ch/svn/kob_gamelab09/trunk@207 fc16ba98-2866-4055-be8f-df951a5456ab
</commit_message>
<xml_diff>
--- a/documentation/prototype presentation.pptx
+++ b/documentation/prototype presentation.pptx
@@ -196,7 +196,7 @@
             <a:fld id="{241B2CAE-C838-4555-AE09-781673F6E96D}" type="datetimeFigureOut">
               <a:rPr lang="de-DE" smtClean="0"/>
               <a:pPr/>
-              <a:t>16.03.2009</a:t>
+              <a:t>17.03.2009</a:t>
             </a:fld>
             <a:endParaRPr lang="de-CH"/>
           </a:p>
@@ -656,7 +656,7 @@
             <a:fld id="{491AFB38-7F0F-4E65-9016-729E2F991F73}" type="datetime4">
               <a:rPr lang="en-US" smtClean="0"/>
               <a:pPr/>
-              <a:t>March 16, 2009</a:t>
+              <a:t>March 17, 2009</a:t>
             </a:fld>
             <a:endParaRPr lang="de-CH"/>
           </a:p>
@@ -888,7 +888,7 @@
             <a:fld id="{832CCE04-FC13-47C6-92C8-C6C0081D0F0B}" type="datetime4">
               <a:rPr lang="en-US" smtClean="0"/>
               <a:pPr/>
-              <a:t>March 16, 2009</a:t>
+              <a:t>March 17, 2009</a:t>
             </a:fld>
             <a:endParaRPr lang="de-CH"/>
           </a:p>
@@ -1069,7 +1069,7 @@
             <a:fld id="{2C76FB36-50AB-4B52-84F5-8BB3D4685CDE}" type="datetime4">
               <a:rPr lang="en-US" smtClean="0"/>
               <a:pPr/>
-              <a:t>March 16, 2009</a:t>
+              <a:t>March 17, 2009</a:t>
             </a:fld>
             <a:endParaRPr lang="de-CH"/>
           </a:p>
@@ -1254,7 +1254,7 @@
             <a:fld id="{FD3456F3-F988-4644-9B1F-732BB24E8D12}" type="datetime4">
               <a:rPr lang="en-US" smtClean="0"/>
               <a:pPr/>
-              <a:t>March 16, 2009</a:t>
+              <a:t>March 17, 2009</a:t>
             </a:fld>
             <a:endParaRPr lang="de-CH" dirty="0"/>
           </a:p>
@@ -1512,7 +1512,7 @@
             <a:fld id="{72EBF5DF-780F-456C-A555-8B62CA5D4506}" type="datetime4">
               <a:rPr lang="en-US" smtClean="0"/>
               <a:pPr/>
-              <a:t>March 16, 2009</a:t>
+              <a:t>March 17, 2009</a:t>
             </a:fld>
             <a:endParaRPr lang="de-CH"/>
           </a:p>
@@ -1782,7 +1782,7 @@
             <a:fld id="{A5757DA3-6B96-48F2-A79A-08453494CFFD}" type="datetime4">
               <a:rPr lang="en-US" smtClean="0"/>
               <a:pPr/>
-              <a:t>March 16, 2009</a:t>
+              <a:t>March 17, 2009</a:t>
             </a:fld>
             <a:endParaRPr lang="de-CH"/>
           </a:p>
@@ -2162,7 +2162,7 @@
             <a:fld id="{F2984DBB-B553-4E56-982F-D704A07319BD}" type="datetime4">
               <a:rPr lang="en-US" smtClean="0"/>
               <a:pPr/>
-              <a:t>March 16, 2009</a:t>
+              <a:t>March 17, 2009</a:t>
             </a:fld>
             <a:endParaRPr lang="de-CH"/>
           </a:p>
@@ -2281,7 +2281,7 @@
             <a:fld id="{0166FAD9-9585-46A3-BF5D-CB6DCF8840DE}" type="datetime4">
               <a:rPr lang="en-US" smtClean="0"/>
               <a:pPr/>
-              <a:t>March 16, 2009</a:t>
+              <a:t>March 17, 2009</a:t>
             </a:fld>
             <a:endParaRPr lang="de-CH"/>
           </a:p>
@@ -2377,7 +2377,7 @@
             <a:fld id="{5A66393E-1007-4886-9255-6344016076B5}" type="datetime4">
               <a:rPr lang="en-US" smtClean="0"/>
               <a:pPr/>
-              <a:t>March 16, 2009</a:t>
+              <a:t>March 17, 2009</a:t>
             </a:fld>
             <a:endParaRPr lang="de-CH"/>
           </a:p>
@@ -2641,7 +2641,7 @@
             <a:fld id="{AE06ED30-A47D-4BBF-B947-A4BA2E745E95}" type="datetime4">
               <a:rPr lang="en-US" smtClean="0"/>
               <a:pPr/>
-              <a:t>March 16, 2009</a:t>
+              <a:t>March 17, 2009</a:t>
             </a:fld>
             <a:endParaRPr lang="de-CH"/>
           </a:p>
@@ -2911,7 +2911,7 @@
             <a:fld id="{CE86EBBF-7759-4BBD-BA88-87224CF75B38}" type="datetime4">
               <a:rPr lang="en-US" smtClean="0"/>
               <a:pPr/>
-              <a:t>March 16, 2009</a:t>
+              <a:t>March 17, 2009</a:t>
             </a:fld>
             <a:endParaRPr lang="de-CH"/>
           </a:p>
@@ -3143,7 +3143,7 @@
             <a:fld id="{02438F3C-2C7D-43CB-8D4A-14AB2F777FBE}" type="datetime4">
               <a:rPr lang="en-US" smtClean="0"/>
               <a:pPr/>
-              <a:t>March 16, 2009</a:t>
+              <a:t>March 17, 2009</a:t>
             </a:fld>
             <a:endParaRPr lang="de-CH"/>
           </a:p>
@@ -3903,7 +3903,6 @@
               <a:rPr lang="en-US" dirty="0" smtClean="0"/>
               <a:t>Moving Islands</a:t>
             </a:r>
-            <a:endParaRPr lang="en-US" dirty="0" smtClean="0"/>
           </a:p>
           <a:p>
             <a:r>
@@ -3912,22 +3911,6 @@
             </a:r>
             <a:endParaRPr lang="en-US" dirty="0" smtClean="0"/>
           </a:p>
-          <a:p>
-            <a:r>
-              <a:rPr lang="en-US" dirty="0" smtClean="0"/>
-              <a:t>Shadows</a:t>
-            </a:r>
-            <a:endParaRPr lang="en-US" dirty="0" smtClean="0"/>
-          </a:p>
-          <a:p>
-            <a:r>
-              <a:rPr lang="en-US" dirty="0" smtClean="0"/>
-              <a:t>Console</a:t>
-            </a:r>
-          </a:p>
-          <a:p>
-            <a:endParaRPr lang="en-US" dirty="0" smtClean="0"/>
-          </a:p>
         </p:txBody>
       </p:sp>
       <p:sp>
@@ -3971,7 +3954,7 @@
             <a:fld id="{68B3A63F-3C21-45A5-881E-7079D21D2553}" type="datetime4">
               <a:rPr lang="en-US" smtClean="0"/>
               <a:pPr/>
-              <a:t>March 16, 2009</a:t>
+              <a:t>March 17, 2009</a:t>
             </a:fld>
             <a:endParaRPr lang="de-CH" dirty="0"/>
           </a:p>
@@ -4142,7 +4125,6 @@
               <a:rPr lang="en-US" dirty="0" smtClean="0"/>
               <a:t>Ice spike</a:t>
             </a:r>
-            <a:endParaRPr lang="en-US" dirty="0" smtClean="0"/>
           </a:p>
           <a:p>
             <a:r>
@@ -4155,14 +4137,12 @@
               <a:rPr lang="en-US" dirty="0" smtClean="0"/>
               <a:t>Hit &amp; pushback</a:t>
             </a:r>
-            <a:endParaRPr lang="en-US" dirty="0" smtClean="0"/>
           </a:p>
           <a:p>
             <a:r>
               <a:rPr lang="en-US" dirty="0" smtClean="0"/>
               <a:t>Sound</a:t>
             </a:r>
-            <a:endParaRPr lang="en-US" dirty="0" smtClean="0"/>
           </a:p>
           <a:p>
             <a:endParaRPr lang="en-US" dirty="0" smtClean="0"/>
@@ -4213,7 +4193,7 @@
             <a:fld id="{EE9DF18A-702D-492C-8FAA-404C4DC0A077}" type="datetime4">
               <a:rPr lang="en-US" smtClean="0"/>
               <a:pPr/>
-              <a:t>March 16, 2009</a:t>
+              <a:t>March 17, 2009</a:t>
             </a:fld>
             <a:endParaRPr lang="en-US"/>
           </a:p>
@@ -4384,17 +4364,8 @@
             <a:pPr lvl="1"/>
             <a:r>
               <a:rPr lang="en-US" dirty="0" smtClean="0"/>
-              <a:t>Camera (angle, </a:t>
-            </a:r>
-            <a:r>
-              <a:rPr lang="en-US" dirty="0" smtClean="0"/>
-              <a:t>focal </a:t>
-            </a:r>
-            <a:r>
-              <a:rPr lang="en-US" dirty="0" smtClean="0"/>
-              <a:t>length)</a:t>
-            </a:r>
-            <a:endParaRPr lang="en-US" dirty="0" smtClean="0"/>
+              <a:t>Camera (angle, focal length)</a:t>
+            </a:r>
           </a:p>
           <a:p>
             <a:r>
@@ -4408,7 +4379,6 @@
               <a:rPr lang="en-US" dirty="0" smtClean="0"/>
               <a:t>Don’t fall from island</a:t>
             </a:r>
-            <a:endParaRPr lang="en-US" dirty="0" smtClean="0"/>
           </a:p>
           <a:p>
             <a:r>
@@ -4435,7 +4405,6 @@
               <a:rPr lang="en-US" dirty="0" smtClean="0"/>
               <a:t>Parameter tuning</a:t>
             </a:r>
-            <a:endParaRPr lang="en-US" dirty="0" smtClean="0"/>
           </a:p>
           <a:p>
             <a:endParaRPr lang="en-US" dirty="0"/>
@@ -4483,7 +4452,7 @@
             <a:fld id="{FD3456F3-F988-4644-9B1F-732BB24E8D12}" type="datetime4">
               <a:rPr lang="en-US" smtClean="0"/>
               <a:pPr/>
-              <a:t>March 16, 2009</a:t>
+              <a:t>March 17, 2009</a:t>
             </a:fld>
             <a:endParaRPr lang="en-US"/>
           </a:p>

</xml_diff>